<commit_message>
References & Poster Update
</commit_message>
<xml_diff>
--- a/Poster/Final_Project_Poster.pptx
+++ b/Poster/Final_Project_Poster.pptx
@@ -208,7 +208,7 @@
           <a:p>
             <a:fld id="{86FCF8FA-07B3-4E7C-9A6C-CD3046198110}" type="datetimeFigureOut">
               <a:rPr lang="en-US" smtClean="0"/>
-              <a:t>4/12/19</a:t>
+              <a:t>4/13/19</a:t>
             </a:fld>
             <a:endParaRPr lang="en-US"/>
           </a:p>
@@ -7198,7 +7198,7 @@
             <a:fld id="{96DFF08F-DC6B-4601-B491-B0F83F6DD2DA}" type="datetimeFigureOut">
               <a:rPr lang="en-US" smtClean="0"/>
               <a:pPr/>
-              <a:t>4/12/19</a:t>
+              <a:t>4/13/19</a:t>
             </a:fld>
             <a:endParaRPr lang="en-US" dirty="0"/>
           </a:p>
@@ -7405,7 +7405,7 @@
           <a:p>
             <a:fld id="{96DFF08F-DC6B-4601-B491-B0F83F6DD2DA}" type="datetimeFigureOut">
               <a:rPr lang="en-US" smtClean="0"/>
-              <a:t>4/12/19</a:t>
+              <a:t>4/13/19</a:t>
             </a:fld>
             <a:endParaRPr lang="en-US" dirty="0"/>
           </a:p>
@@ -7585,7 +7585,7 @@
           <a:p>
             <a:fld id="{96DFF08F-DC6B-4601-B491-B0F83F6DD2DA}" type="datetimeFigureOut">
               <a:rPr lang="en-US" smtClean="0"/>
-              <a:t>4/12/19</a:t>
+              <a:t>4/13/19</a:t>
             </a:fld>
             <a:endParaRPr lang="en-US" dirty="0"/>
           </a:p>
@@ -7790,7 +7790,7 @@
           <a:p>
             <a:fld id="{96DFF08F-DC6B-4601-B491-B0F83F6DD2DA}" type="datetimeFigureOut">
               <a:rPr lang="en-US" smtClean="0"/>
-              <a:t>4/12/19</a:t>
+              <a:t>4/13/19</a:t>
             </a:fld>
             <a:endParaRPr lang="en-US" dirty="0"/>
           </a:p>
@@ -14528,7 +14528,7 @@
           <a:p>
             <a:fld id="{96DFF08F-DC6B-4601-B491-B0F83F6DD2DA}" type="datetimeFigureOut">
               <a:rPr lang="en-US" smtClean="0"/>
-              <a:t>4/12/19</a:t>
+              <a:t>4/13/19</a:t>
             </a:fld>
             <a:endParaRPr lang="en-US" dirty="0"/>
           </a:p>
@@ -14802,7 +14802,7 @@
           <a:p>
             <a:fld id="{96DFF08F-DC6B-4601-B491-B0F83F6DD2DA}" type="datetimeFigureOut">
               <a:rPr lang="en-US" smtClean="0"/>
-              <a:t>4/12/19</a:t>
+              <a:t>4/13/19</a:t>
             </a:fld>
             <a:endParaRPr lang="en-US" dirty="0"/>
           </a:p>
@@ -15205,7 +15205,7 @@
           <a:p>
             <a:fld id="{96DFF08F-DC6B-4601-B491-B0F83F6DD2DA}" type="datetimeFigureOut">
               <a:rPr lang="en-US" smtClean="0"/>
-              <a:t>4/12/19</a:t>
+              <a:t>4/13/19</a:t>
             </a:fld>
             <a:endParaRPr lang="en-US" dirty="0"/>
           </a:p>
@@ -15323,7 +15323,7 @@
           <a:p>
             <a:fld id="{96DFF08F-DC6B-4601-B491-B0F83F6DD2DA}" type="datetimeFigureOut">
               <a:rPr lang="en-US" smtClean="0"/>
-              <a:t>4/12/19</a:t>
+              <a:t>4/13/19</a:t>
             </a:fld>
             <a:endParaRPr lang="en-US" dirty="0"/>
           </a:p>
@@ -15418,7 +15418,7 @@
           <a:p>
             <a:fld id="{96DFF08F-DC6B-4601-B491-B0F83F6DD2DA}" type="datetimeFigureOut">
               <a:rPr lang="en-US" smtClean="0"/>
-              <a:t>4/12/19</a:t>
+              <a:t>4/13/19</a:t>
             </a:fld>
             <a:endParaRPr lang="en-US" dirty="0"/>
           </a:p>
@@ -15710,7 +15710,7 @@
           <a:p>
             <a:fld id="{96DFF08F-DC6B-4601-B491-B0F83F6DD2DA}" type="datetimeFigureOut">
               <a:rPr lang="en-US" smtClean="0"/>
-              <a:t>4/12/19</a:t>
+              <a:t>4/13/19</a:t>
             </a:fld>
             <a:endParaRPr lang="en-US" dirty="0"/>
           </a:p>
@@ -15990,7 +15990,7 @@
           <a:p>
             <a:fld id="{9CDD058F-B960-4439-B370-43D89816EE05}" type="datetimeFigureOut">
               <a:rPr lang="en-US" smtClean="0"/>
-              <a:t>4/12/19</a:t>
+              <a:t>4/13/19</a:t>
             </a:fld>
             <a:endParaRPr lang="en-US" dirty="0"/>
           </a:p>
@@ -16241,7 +16241,7 @@
             <a:fld id="{96DFF08F-DC6B-4601-B491-B0F83F6DD2DA}" type="datetimeFigureOut">
               <a:rPr lang="en-US" smtClean="0"/>
               <a:pPr/>
-              <a:t>4/12/19</a:t>
+              <a:t>4/13/19</a:t>
             </a:fld>
             <a:endParaRPr lang="en-US" dirty="0"/>
           </a:p>
@@ -16988,8 +16988,8 @@
         </p:nvSpPr>
         <p:spPr>
           <a:xfrm>
-            <a:off x="1105182" y="6093305"/>
-            <a:ext cx="13449171" cy="8792846"/>
+            <a:off x="1105183" y="6093305"/>
+            <a:ext cx="13220418" cy="8792846"/>
           </a:xfrm>
           <a:prstGeom prst="rect">
             <a:avLst/>
@@ -17574,7 +17574,7 @@
         </p:nvSpPr>
         <p:spPr>
           <a:xfrm rot="10800000" flipV="1">
-            <a:off x="17877160" y="4725173"/>
+            <a:off x="16538472" y="4780814"/>
             <a:ext cx="9555341" cy="1200329"/>
           </a:xfrm>
           <a:prstGeom prst="rect">
@@ -17611,7 +17611,7 @@
         </p:nvSpPr>
         <p:spPr>
           <a:xfrm rot="10800000" flipV="1">
-            <a:off x="17851975" y="18356724"/>
+            <a:off x="15910560" y="18443131"/>
             <a:ext cx="10976860" cy="1200329"/>
           </a:xfrm>
           <a:prstGeom prst="rect">
@@ -17685,7 +17685,7 @@
         </p:nvSpPr>
         <p:spPr>
           <a:xfrm>
-            <a:off x="17388589" y="6165112"/>
+            <a:off x="16560115" y="6087262"/>
             <a:ext cx="12525239" cy="3910225"/>
           </a:xfrm>
           <a:prstGeom prst="rect">
@@ -17771,7 +17771,7 @@
         </p:nvSpPr>
         <p:spPr>
           <a:xfrm>
-            <a:off x="17876269" y="19762245"/>
+            <a:off x="16560115" y="19911014"/>
             <a:ext cx="12525239" cy="3910225"/>
           </a:xfrm>
           <a:prstGeom prst="rect">
@@ -17857,7 +17857,7 @@
         </p:nvSpPr>
         <p:spPr>
           <a:xfrm rot="10800000" flipV="1">
-            <a:off x="18764714" y="29441915"/>
+            <a:off x="29960806" y="27746446"/>
             <a:ext cx="10495935" cy="1200329"/>
           </a:xfrm>
           <a:prstGeom prst="rect">
@@ -17877,6 +17877,161 @@
               </a:rPr>
               <a:t> References</a:t>
             </a:r>
+          </a:p>
+        </p:txBody>
+      </p:sp>
+      <p:sp>
+        <p:nvSpPr>
+          <p:cNvPr id="24" name="TextBox 67">
+            <a:extLst>
+              <a:ext uri="{FF2B5EF4-FFF2-40B4-BE49-F238E27FC236}">
+                <a16:creationId xmlns:a16="http://schemas.microsoft.com/office/drawing/2014/main" id="{68E28B64-EE21-CF49-B7DC-9DC12908DDF2}"/>
+              </a:ext>
+            </a:extLst>
+          </p:cNvPr>
+          <p:cNvSpPr txBox="1"/>
+          <p:nvPr/>
+        </p:nvSpPr>
+        <p:spPr>
+          <a:xfrm>
+            <a:off x="30281936" y="29307862"/>
+            <a:ext cx="12525239" cy="2689626"/>
+          </a:xfrm>
+          <a:prstGeom prst="rect">
+            <a:avLst/>
+          </a:prstGeom>
+          <a:noFill/>
+        </p:spPr>
+        <p:txBody>
+          <a:bodyPr wrap="square" lIns="0" tIns="0" rIns="0" bIns="0" rtlCol="0" anchor="t" anchorCtr="0">
+            <a:noAutofit/>
+          </a:bodyPr>
+          <a:lstStyle/>
+          <a:p>
+            <a:pPr marL="444500" indent="-444500"/>
+            <a:r>
+              <a:rPr lang="de-AT" sz="3600" dirty="0"/>
+              <a:t>Daniel Falbel, e. a. Package ‘</a:t>
+            </a:r>
+            <a:r>
+              <a:rPr lang="de-AT" sz="3600" dirty="0" err="1"/>
+              <a:t>keras</a:t>
+            </a:r>
+            <a:r>
+              <a:rPr lang="de-AT" sz="3600" dirty="0"/>
+              <a:t>’. </a:t>
+            </a:r>
+            <a:endParaRPr lang="de-AT" sz="9600" dirty="0"/>
+          </a:p>
+          <a:p>
+            <a:pPr marL="444500" indent="-444500"/>
+            <a:r>
+              <a:rPr lang="de-AT" sz="3600" dirty="0"/>
+              <a:t>J.A. Guerrero, J. M.-D. Package ‘</a:t>
+            </a:r>
+            <a:r>
+              <a:rPr lang="de-AT" sz="3600" dirty="0" err="1"/>
+              <a:t>biosignalEMG</a:t>
+            </a:r>
+            <a:r>
+              <a:rPr lang="de-AT" sz="3600" dirty="0"/>
+              <a:t>’. </a:t>
+            </a:r>
+            <a:endParaRPr lang="de-AT" sz="9600" dirty="0"/>
+          </a:p>
+          <a:p>
+            <a:pPr marL="444500" indent="-444500"/>
+            <a:r>
+              <a:rPr lang="de-AT" sz="3600" dirty="0"/>
+              <a:t>Sergey </a:t>
+            </a:r>
+            <a:r>
+              <a:rPr lang="de-AT" sz="3600" dirty="0" err="1"/>
+              <a:t>Lobov</a:t>
+            </a:r>
+            <a:r>
+              <a:rPr lang="de-AT" sz="3600" dirty="0"/>
+              <a:t>, Nadia </a:t>
+            </a:r>
+            <a:r>
+              <a:rPr lang="de-AT" sz="3600" dirty="0" err="1"/>
+              <a:t>Krilova</a:t>
+            </a:r>
+            <a:r>
+              <a:rPr lang="de-AT" sz="3600" dirty="0"/>
+              <a:t>, I. K. V. K. </a:t>
+            </a:r>
+            <a:r>
+              <a:rPr lang="de-AT" sz="3600" dirty="0" err="1"/>
+              <a:t>and</a:t>
+            </a:r>
+            <a:r>
+              <a:rPr lang="de-AT" sz="3600" dirty="0"/>
+              <a:t> V. A. </a:t>
+            </a:r>
+            <a:r>
+              <a:rPr lang="de-AT" sz="3600" dirty="0" err="1"/>
+              <a:t>Makarov</a:t>
+            </a:r>
+            <a:r>
+              <a:rPr lang="de-AT" sz="3600" dirty="0"/>
+              <a:t> (2018). Latent </a:t>
+            </a:r>
+            <a:r>
+              <a:rPr lang="de-AT" sz="3600" dirty="0" err="1"/>
+              <a:t>factors</a:t>
+            </a:r>
+            <a:r>
+              <a:rPr lang="de-AT" sz="3600" dirty="0"/>
+              <a:t> </a:t>
+            </a:r>
+            <a:r>
+              <a:rPr lang="de-AT" sz="3600" dirty="0" err="1"/>
+              <a:t>limiting</a:t>
+            </a:r>
+            <a:r>
+              <a:rPr lang="de-AT" sz="3600" dirty="0"/>
+              <a:t> </a:t>
+            </a:r>
+            <a:r>
+              <a:rPr lang="de-AT" sz="3600" dirty="0" err="1"/>
+              <a:t>the</a:t>
+            </a:r>
+            <a:r>
+              <a:rPr lang="de-AT" sz="3600" dirty="0"/>
+              <a:t> </a:t>
+            </a:r>
+            <a:r>
+              <a:rPr lang="de-AT" sz="3600" dirty="0" err="1"/>
+              <a:t>performance</a:t>
+            </a:r>
+            <a:r>
+              <a:rPr lang="de-AT" sz="3600" dirty="0"/>
+              <a:t> </a:t>
+            </a:r>
+            <a:r>
+              <a:rPr lang="de-AT" sz="3600" dirty="0" err="1"/>
+              <a:t>of</a:t>
+            </a:r>
+            <a:r>
+              <a:rPr lang="de-AT" sz="3600" dirty="0"/>
+              <a:t> </a:t>
+            </a:r>
+            <a:r>
+              <a:rPr lang="de-AT" sz="3600" dirty="0" err="1"/>
+              <a:t>semg</a:t>
+            </a:r>
+            <a:r>
+              <a:rPr lang="de-AT" sz="3600" dirty="0"/>
+              <a:t>-interfaces. Sensors 18(1122). </a:t>
+            </a:r>
+            <a:endParaRPr lang="de-AT" sz="9600" dirty="0"/>
+          </a:p>
+          <a:p>
+            <a:endParaRPr lang="en-US" sz="6000" dirty="0">
+              <a:latin typeface="Times New Roman"/>
+              <a:cs typeface="Times New Roman"/>
+            </a:endParaRPr>
           </a:p>
         </p:txBody>
       </p:sp>

</xml_diff>

<commit_message>
Poster update + Flow
</commit_message>
<xml_diff>
--- a/Poster/Final_Project_Poster.pptx
+++ b/Poster/Final_Project_Poster.pptx
@@ -110,12 +110,12 @@
   <p:extLst>
     <p:ext uri="{EFAFB233-063F-42B5-8137-9DF3F51BA10A}">
       <p15:sldGuideLst xmlns:p15="http://schemas.microsoft.com/office/powerpoint/2012/main">
-        <p15:guide id="1" orient="horz" pos="10368" userDrawn="1">
+        <p15:guide id="1" orient="horz" pos="10323" userDrawn="1">
           <p15:clr>
             <a:srgbClr val="A4A3A4"/>
           </p15:clr>
         </p15:guide>
-        <p15:guide id="2" pos="13824" userDrawn="1">
+        <p15:guide id="2" pos="13756" userDrawn="1">
           <p15:clr>
             <a:srgbClr val="A4A3A4"/>
           </p15:clr>
@@ -208,7 +208,7 @@
           <a:p>
             <a:fld id="{86FCF8FA-07B3-4E7C-9A6C-CD3046198110}" type="datetimeFigureOut">
               <a:rPr lang="en-US" smtClean="0"/>
-              <a:t>4/13/19</a:t>
+              <a:t>4/14/19</a:t>
             </a:fld>
             <a:endParaRPr lang="en-US"/>
           </a:p>
@@ -7198,7 +7198,7 @@
             <a:fld id="{96DFF08F-DC6B-4601-B491-B0F83F6DD2DA}" type="datetimeFigureOut">
               <a:rPr lang="en-US" smtClean="0"/>
               <a:pPr/>
-              <a:t>4/13/19</a:t>
+              <a:t>4/14/19</a:t>
             </a:fld>
             <a:endParaRPr lang="en-US" dirty="0"/>
           </a:p>
@@ -7405,7 +7405,7 @@
           <a:p>
             <a:fld id="{96DFF08F-DC6B-4601-B491-B0F83F6DD2DA}" type="datetimeFigureOut">
               <a:rPr lang="en-US" smtClean="0"/>
-              <a:t>4/13/19</a:t>
+              <a:t>4/14/19</a:t>
             </a:fld>
             <a:endParaRPr lang="en-US" dirty="0"/>
           </a:p>
@@ -7585,7 +7585,7 @@
           <a:p>
             <a:fld id="{96DFF08F-DC6B-4601-B491-B0F83F6DD2DA}" type="datetimeFigureOut">
               <a:rPr lang="en-US" smtClean="0"/>
-              <a:t>4/13/19</a:t>
+              <a:t>4/14/19</a:t>
             </a:fld>
             <a:endParaRPr lang="en-US" dirty="0"/>
           </a:p>
@@ -7790,7 +7790,7 @@
           <a:p>
             <a:fld id="{96DFF08F-DC6B-4601-B491-B0F83F6DD2DA}" type="datetimeFigureOut">
               <a:rPr lang="en-US" smtClean="0"/>
-              <a:t>4/13/19</a:t>
+              <a:t>4/14/19</a:t>
             </a:fld>
             <a:endParaRPr lang="en-US" dirty="0"/>
           </a:p>
@@ -14528,7 +14528,7 @@
           <a:p>
             <a:fld id="{96DFF08F-DC6B-4601-B491-B0F83F6DD2DA}" type="datetimeFigureOut">
               <a:rPr lang="en-US" smtClean="0"/>
-              <a:t>4/13/19</a:t>
+              <a:t>4/14/19</a:t>
             </a:fld>
             <a:endParaRPr lang="en-US" dirty="0"/>
           </a:p>
@@ -14802,7 +14802,7 @@
           <a:p>
             <a:fld id="{96DFF08F-DC6B-4601-B491-B0F83F6DD2DA}" type="datetimeFigureOut">
               <a:rPr lang="en-US" smtClean="0"/>
-              <a:t>4/13/19</a:t>
+              <a:t>4/14/19</a:t>
             </a:fld>
             <a:endParaRPr lang="en-US" dirty="0"/>
           </a:p>
@@ -15205,7 +15205,7 @@
           <a:p>
             <a:fld id="{96DFF08F-DC6B-4601-B491-B0F83F6DD2DA}" type="datetimeFigureOut">
               <a:rPr lang="en-US" smtClean="0"/>
-              <a:t>4/13/19</a:t>
+              <a:t>4/14/19</a:t>
             </a:fld>
             <a:endParaRPr lang="en-US" dirty="0"/>
           </a:p>
@@ -15323,7 +15323,7 @@
           <a:p>
             <a:fld id="{96DFF08F-DC6B-4601-B491-B0F83F6DD2DA}" type="datetimeFigureOut">
               <a:rPr lang="en-US" smtClean="0"/>
-              <a:t>4/13/19</a:t>
+              <a:t>4/14/19</a:t>
             </a:fld>
             <a:endParaRPr lang="en-US" dirty="0"/>
           </a:p>
@@ -15418,7 +15418,7 @@
           <a:p>
             <a:fld id="{96DFF08F-DC6B-4601-B491-B0F83F6DD2DA}" type="datetimeFigureOut">
               <a:rPr lang="en-US" smtClean="0"/>
-              <a:t>4/13/19</a:t>
+              <a:t>4/14/19</a:t>
             </a:fld>
             <a:endParaRPr lang="en-US" dirty="0"/>
           </a:p>
@@ -15710,7 +15710,7 @@
           <a:p>
             <a:fld id="{96DFF08F-DC6B-4601-B491-B0F83F6DD2DA}" type="datetimeFigureOut">
               <a:rPr lang="en-US" smtClean="0"/>
-              <a:t>4/13/19</a:t>
+              <a:t>4/14/19</a:t>
             </a:fld>
             <a:endParaRPr lang="en-US" dirty="0"/>
           </a:p>
@@ -15990,7 +15990,7 @@
           <a:p>
             <a:fld id="{9CDD058F-B960-4439-B370-43D89816EE05}" type="datetimeFigureOut">
               <a:rPr lang="en-US" smtClean="0"/>
-              <a:t>4/13/19</a:t>
+              <a:t>4/14/19</a:t>
             </a:fld>
             <a:endParaRPr lang="en-US" dirty="0"/>
           </a:p>
@@ -16241,7 +16241,7 @@
             <a:fld id="{96DFF08F-DC6B-4601-B491-B0F83F6DD2DA}" type="datetimeFigureOut">
               <a:rPr lang="en-US" smtClean="0"/>
               <a:pPr/>
-              <a:t>4/13/19</a:t>
+              <a:t>4/14/19</a:t>
             </a:fld>
             <a:endParaRPr lang="en-US" dirty="0"/>
           </a:p>
@@ -17371,7 +17371,7 @@
         </p:nvSpPr>
         <p:spPr>
           <a:xfrm rot="10800000" flipV="1">
-            <a:off x="894734" y="24862468"/>
+            <a:off x="1129336" y="11799719"/>
             <a:ext cx="15503506" cy="1200329"/>
           </a:xfrm>
           <a:prstGeom prst="rect">
@@ -17457,37 +17457,6 @@
       </p:sp>
       <p:sp>
         <p:nvSpPr>
-          <p:cNvPr id="42" name="Rectangle 53"/>
-          <p:cNvSpPr/>
-          <p:nvPr/>
-        </p:nvSpPr>
-        <p:spPr>
-          <a:xfrm rot="10800000" flipV="1">
-            <a:off x="1437174" y="21009472"/>
-            <a:ext cx="7575935" cy="707886"/>
-          </a:xfrm>
-          <a:prstGeom prst="rect">
-            <a:avLst/>
-          </a:prstGeom>
-        </p:spPr>
-        <p:txBody>
-          <a:bodyPr wrap="square">
-            <a:spAutoFit/>
-          </a:bodyPr>
-          <a:lstStyle/>
-          <a:p>
-            <a:r>
-              <a:rPr kumimoji="1" lang="en-US" altLang="zh-CN" sz="4000" dirty="0">
-                <a:latin typeface="Garamond" panose="02020404030301010803" pitchFamily="18" charset="0"/>
-                <a:cs typeface="Times New Roman" panose="02020603050405020304" pitchFamily="18" charset="0"/>
-              </a:rPr>
-              <a:t>Figure1. xxx</a:t>
-            </a:r>
-          </a:p>
-        </p:txBody>
-      </p:sp>
-      <p:sp>
-        <p:nvSpPr>
           <p:cNvPr id="46" name="Rectangle 45">
             <a:extLst>
               <a:ext uri="{FF2B5EF4-FFF2-40B4-BE49-F238E27FC236}">
@@ -17500,7 +17469,7 @@
         </p:nvSpPr>
         <p:spPr>
           <a:xfrm rot="10800000" flipV="1">
-            <a:off x="670492" y="16067713"/>
+            <a:off x="931624" y="15884224"/>
             <a:ext cx="15361987" cy="1200329"/>
           </a:xfrm>
           <a:prstGeom prst="rect">
@@ -17518,7 +17487,7 @@
                 <a:latin typeface="Garamond" panose="02020404030301010803" pitchFamily="18" charset="0"/>
                 <a:cs typeface="Times New Roman"/>
               </a:rPr>
-              <a:t> Method</a:t>
+              <a:t> Methods</a:t>
             </a:r>
           </a:p>
         </p:txBody>
@@ -17574,7 +17543,7 @@
         </p:nvSpPr>
         <p:spPr>
           <a:xfrm rot="10800000" flipV="1">
-            <a:off x="16538472" y="4780814"/>
+            <a:off x="30281936" y="5523910"/>
             <a:ext cx="9555341" cy="1200329"/>
           </a:xfrm>
           <a:prstGeom prst="rect">
@@ -17611,7 +17580,7 @@
         </p:nvSpPr>
         <p:spPr>
           <a:xfrm rot="10800000" flipV="1">
-            <a:off x="29085354" y="4706390"/>
+            <a:off x="30281936" y="21785982"/>
             <a:ext cx="10976860" cy="1200329"/>
           </a:xfrm>
           <a:prstGeom prst="rect">
@@ -17629,7 +17598,7 @@
                 <a:latin typeface="Garamond" panose="02020404030301010803" pitchFamily="18" charset="0"/>
                 <a:cs typeface="Times New Roman"/>
               </a:rPr>
-              <a:t>   Discussion/Conclusion</a:t>
+              <a:t>Discussion/Conclusion</a:t>
             </a:r>
           </a:p>
         </p:txBody>
@@ -17648,7 +17617,7 @@
         </p:nvSpPr>
         <p:spPr>
           <a:xfrm rot="10800000" flipV="1">
-            <a:off x="1382112" y="27562631"/>
+            <a:off x="931624" y="13406620"/>
             <a:ext cx="7575935" cy="707886"/>
           </a:xfrm>
           <a:prstGeom prst="rect">
@@ -17685,8 +17654,8 @@
         </p:nvSpPr>
         <p:spPr>
           <a:xfrm>
-            <a:off x="16560115" y="6087261"/>
-            <a:ext cx="12525239" cy="18550191"/>
+            <a:off x="931623" y="22191352"/>
+            <a:ext cx="13393978" cy="12248191"/>
           </a:xfrm>
           <a:prstGeom prst="rect">
             <a:avLst/>
@@ -17725,10 +17694,7 @@
             </a:r>
           </a:p>
           <a:p>
-            <a:pPr marL="1314450" lvl="1" indent="-857250">
-              <a:buFont typeface="Wingdings" pitchFamily="2" charset="2"/>
-              <a:buChar char="§"/>
-            </a:pPr>
+            <a:pPr lvl="1"/>
             <a:r>
               <a:rPr lang="en-US" sz="4800" dirty="0">
                 <a:latin typeface="Times New Roman"/>
@@ -17841,100 +17807,6 @@
             </a:endParaRPr>
           </a:p>
           <a:p>
-            <a:pPr marL="857250" indent="-857250">
-              <a:buFont typeface="Wingdings" pitchFamily="2" charset="2"/>
-              <a:buChar char="§"/>
-            </a:pPr>
-            <a:endParaRPr lang="en-US" sz="4800" dirty="0">
-              <a:latin typeface="Times New Roman"/>
-              <a:cs typeface="Times New Roman"/>
-            </a:endParaRPr>
-          </a:p>
-          <a:p>
-            <a:pPr marL="857250" indent="-857250">
-              <a:buFont typeface="Wingdings" pitchFamily="2" charset="2"/>
-              <a:buChar char="§"/>
-            </a:pPr>
-            <a:endParaRPr lang="en-US" sz="4800" dirty="0">
-              <a:latin typeface="Times New Roman"/>
-              <a:cs typeface="Times New Roman"/>
-            </a:endParaRPr>
-          </a:p>
-          <a:p>
-            <a:pPr marL="857250" indent="-857250">
-              <a:buFont typeface="Wingdings" pitchFamily="2" charset="2"/>
-              <a:buChar char="§"/>
-            </a:pPr>
-            <a:endParaRPr lang="en-US" sz="4800" dirty="0">
-              <a:latin typeface="Times New Roman"/>
-              <a:cs typeface="Times New Roman"/>
-            </a:endParaRPr>
-          </a:p>
-          <a:p>
-            <a:pPr marL="857250" indent="-857250">
-              <a:buFont typeface="Wingdings" pitchFamily="2" charset="2"/>
-              <a:buChar char="§"/>
-            </a:pPr>
-            <a:endParaRPr lang="en-US" sz="4800" dirty="0">
-              <a:latin typeface="Times New Roman"/>
-              <a:cs typeface="Times New Roman"/>
-            </a:endParaRPr>
-          </a:p>
-          <a:p>
-            <a:pPr marL="857250" indent="-857250">
-              <a:buFont typeface="Wingdings" pitchFamily="2" charset="2"/>
-              <a:buChar char="§"/>
-            </a:pPr>
-            <a:endParaRPr lang="en-US" sz="4800" dirty="0">
-              <a:latin typeface="Times New Roman"/>
-              <a:cs typeface="Times New Roman"/>
-            </a:endParaRPr>
-          </a:p>
-          <a:p>
-            <a:pPr marL="857250" indent="-857250">
-              <a:buFont typeface="Wingdings" pitchFamily="2" charset="2"/>
-              <a:buChar char="§"/>
-            </a:pPr>
-            <a:endParaRPr lang="en-US" sz="4800" dirty="0">
-              <a:latin typeface="Times New Roman"/>
-              <a:cs typeface="Times New Roman"/>
-            </a:endParaRPr>
-          </a:p>
-          <a:p>
-            <a:pPr marL="857250" indent="-857250">
-              <a:buFont typeface="Wingdings" pitchFamily="2" charset="2"/>
-              <a:buChar char="§"/>
-            </a:pPr>
-            <a:r>
-              <a:rPr lang="en-US" sz="4800" dirty="0" err="1">
-                <a:latin typeface="Times New Roman"/>
-                <a:cs typeface="Times New Roman"/>
-              </a:rPr>
-              <a:t>Xxxx</a:t>
-            </a:r>
-            <a:endParaRPr lang="en-US" sz="4800" dirty="0">
-              <a:latin typeface="Times New Roman"/>
-              <a:cs typeface="Times New Roman"/>
-            </a:endParaRPr>
-          </a:p>
-          <a:p>
-            <a:pPr marL="857250" indent="-857250">
-              <a:buFont typeface="Wingdings" pitchFamily="2" charset="2"/>
-              <a:buChar char="§"/>
-            </a:pPr>
-            <a:r>
-              <a:rPr lang="en-US" sz="4800" dirty="0" err="1">
-                <a:latin typeface="Times New Roman"/>
-                <a:cs typeface="Times New Roman"/>
-              </a:rPr>
-              <a:t>xxxx</a:t>
-            </a:r>
-            <a:endParaRPr lang="en-US" sz="4800" dirty="0">
-              <a:latin typeface="Times New Roman"/>
-              <a:cs typeface="Times New Roman"/>
-            </a:endParaRPr>
-          </a:p>
-          <a:p>
             <a:endParaRPr lang="en-US" sz="6000" dirty="0">
               <a:latin typeface="Times New Roman"/>
               <a:cs typeface="Times New Roman"/>
@@ -17956,7 +17828,7 @@
         </p:nvSpPr>
         <p:spPr>
           <a:xfrm>
-            <a:off x="29960806" y="5981143"/>
+            <a:off x="30281936" y="23411266"/>
             <a:ext cx="12525239" cy="3910225"/>
           </a:xfrm>
           <a:prstGeom prst="rect">
@@ -18248,7 +18120,7 @@
         </p:blipFill>
         <p:spPr>
           <a:xfrm>
-            <a:off x="17507022" y="9277036"/>
+            <a:off x="1765581" y="24743911"/>
             <a:ext cx="10857322" cy="6031846"/>
           </a:xfrm>
           <a:prstGeom prst="rect">
@@ -18256,6 +18128,336 @@
           </a:prstGeom>
         </p:spPr>
       </p:pic>
+      <p:pic>
+        <p:nvPicPr>
+          <p:cNvPr id="10" name="Grafik 9">
+            <a:extLst>
+              <a:ext uri="{FF2B5EF4-FFF2-40B4-BE49-F238E27FC236}">
+                <a16:creationId xmlns:a16="http://schemas.microsoft.com/office/drawing/2014/main" id="{50778BC2-CD14-E74E-8DF0-CCD18CEE8824}"/>
+              </a:ext>
+            </a:extLst>
+          </p:cNvPr>
+          <p:cNvPicPr>
+            <a:picLocks noChangeAspect="1"/>
+          </p:cNvPicPr>
+          <p:nvPr/>
+        </p:nvPicPr>
+        <p:blipFill>
+          <a:blip r:embed="rId6">
+            <a:extLst>
+              <a:ext uri="{28A0092B-C50C-407E-A947-70E740481C1C}">
+                <a14:useLocalDpi xmlns:a14="http://schemas.microsoft.com/office/drawing/2010/main" val="0"/>
+              </a:ext>
+            </a:extLst>
+          </a:blip>
+          <a:stretch>
+            <a:fillRect/>
+          </a:stretch>
+        </p:blipFill>
+        <p:spPr>
+          <a:xfrm>
+            <a:off x="1765581" y="17207820"/>
+            <a:ext cx="11584659" cy="5570259"/>
+          </a:xfrm>
+          <a:prstGeom prst="rect">
+            <a:avLst/>
+          </a:prstGeom>
+        </p:spPr>
+      </p:pic>
+      <p:pic>
+        <p:nvPicPr>
+          <p:cNvPr id="5" name="Grafik 4">
+            <a:extLst>
+              <a:ext uri="{FF2B5EF4-FFF2-40B4-BE49-F238E27FC236}">
+                <a16:creationId xmlns:a16="http://schemas.microsoft.com/office/drawing/2014/main" id="{BFAE4C62-1E70-274A-ACF4-E810E501B587}"/>
+              </a:ext>
+            </a:extLst>
+          </p:cNvPr>
+          <p:cNvPicPr>
+            <a:picLocks noChangeAspect="1"/>
+          </p:cNvPicPr>
+          <p:nvPr/>
+        </p:nvPicPr>
+        <p:blipFill>
+          <a:blip r:embed="rId7">
+            <a:extLst>
+              <a:ext uri="{28A0092B-C50C-407E-A947-70E740481C1C}">
+                <a14:useLocalDpi xmlns:a14="http://schemas.microsoft.com/office/drawing/2010/main" val="0"/>
+              </a:ext>
+            </a:extLst>
+          </a:blip>
+          <a:stretch>
+            <a:fillRect/>
+          </a:stretch>
+        </p:blipFill>
+        <p:spPr>
+          <a:xfrm>
+            <a:off x="17854187" y="6818564"/>
+            <a:ext cx="8519010" cy="10969294"/>
+          </a:xfrm>
+          <a:prstGeom prst="rect">
+            <a:avLst/>
+          </a:prstGeom>
+        </p:spPr>
+      </p:pic>
+      <p:sp>
+        <p:nvSpPr>
+          <p:cNvPr id="26" name="TextBox 66">
+            <a:extLst>
+              <a:ext uri="{FF2B5EF4-FFF2-40B4-BE49-F238E27FC236}">
+                <a16:creationId xmlns:a16="http://schemas.microsoft.com/office/drawing/2014/main" id="{7B346BDF-8958-BB41-B80B-E011EE42CFE1}"/>
+              </a:ext>
+            </a:extLst>
+          </p:cNvPr>
+          <p:cNvSpPr txBox="1"/>
+          <p:nvPr/>
+        </p:nvSpPr>
+        <p:spPr>
+          <a:xfrm>
+            <a:off x="16171738" y="5582045"/>
+            <a:ext cx="12525239" cy="12248191"/>
+          </a:xfrm>
+          <a:prstGeom prst="rect">
+            <a:avLst/>
+          </a:prstGeom>
+          <a:noFill/>
+        </p:spPr>
+        <p:txBody>
+          <a:bodyPr wrap="square" lIns="0" tIns="0" rIns="0" bIns="0" rtlCol="0" anchor="t" anchorCtr="0">
+            <a:noAutofit/>
+          </a:bodyPr>
+          <a:lstStyle/>
+          <a:p>
+            <a:pPr marL="857250" indent="-857250">
+              <a:buFont typeface="Wingdings" pitchFamily="2" charset="2"/>
+              <a:buChar char="§"/>
+            </a:pPr>
+            <a:r>
+              <a:rPr lang="en-US" sz="4800" dirty="0">
+                <a:latin typeface="Times New Roman"/>
+                <a:cs typeface="Times New Roman"/>
+              </a:rPr>
+              <a:t>ANN structure</a:t>
+            </a:r>
+          </a:p>
+          <a:p>
+            <a:pPr marL="857250" indent="-857250">
+              <a:buFont typeface="Wingdings" pitchFamily="2" charset="2"/>
+              <a:buChar char="§"/>
+            </a:pPr>
+            <a:endParaRPr lang="en-US" sz="4800" dirty="0">
+              <a:latin typeface="Times New Roman"/>
+              <a:cs typeface="Times New Roman"/>
+            </a:endParaRPr>
+          </a:p>
+          <a:p>
+            <a:endParaRPr lang="en-US" sz="4800" dirty="0">
+              <a:latin typeface="Times New Roman"/>
+              <a:cs typeface="Times New Roman"/>
+            </a:endParaRPr>
+          </a:p>
+          <a:p>
+            <a:pPr marL="857250" indent="-857250">
+              <a:buFont typeface="Wingdings" pitchFamily="2" charset="2"/>
+              <a:buChar char="§"/>
+            </a:pPr>
+            <a:endParaRPr lang="en-US" sz="4800" dirty="0">
+              <a:latin typeface="Times New Roman"/>
+              <a:cs typeface="Times New Roman"/>
+            </a:endParaRPr>
+          </a:p>
+          <a:p>
+            <a:pPr marL="857250" indent="-857250">
+              <a:buFont typeface="Wingdings" pitchFamily="2" charset="2"/>
+              <a:buChar char="§"/>
+            </a:pPr>
+            <a:endParaRPr lang="en-US" sz="4800" dirty="0">
+              <a:latin typeface="Times New Roman"/>
+              <a:cs typeface="Times New Roman"/>
+            </a:endParaRPr>
+          </a:p>
+          <a:p>
+            <a:pPr marL="857250" indent="-857250">
+              <a:buFont typeface="Wingdings" pitchFamily="2" charset="2"/>
+              <a:buChar char="§"/>
+            </a:pPr>
+            <a:endParaRPr lang="en-US" sz="4800" dirty="0">
+              <a:latin typeface="Times New Roman"/>
+              <a:cs typeface="Times New Roman"/>
+            </a:endParaRPr>
+          </a:p>
+          <a:p>
+            <a:pPr marL="857250" indent="-857250">
+              <a:buFont typeface="Wingdings" pitchFamily="2" charset="2"/>
+              <a:buChar char="§"/>
+            </a:pPr>
+            <a:endParaRPr lang="en-US" sz="4800" dirty="0">
+              <a:latin typeface="Times New Roman"/>
+              <a:cs typeface="Times New Roman"/>
+            </a:endParaRPr>
+          </a:p>
+          <a:p>
+            <a:pPr marL="857250" indent="-857250">
+              <a:buFont typeface="Wingdings" pitchFamily="2" charset="2"/>
+              <a:buChar char="§"/>
+            </a:pPr>
+            <a:endParaRPr lang="en-US" sz="4800" dirty="0">
+              <a:latin typeface="Times New Roman"/>
+              <a:cs typeface="Times New Roman"/>
+            </a:endParaRPr>
+          </a:p>
+          <a:p>
+            <a:pPr marL="857250" indent="-857250">
+              <a:buFont typeface="Wingdings" pitchFamily="2" charset="2"/>
+              <a:buChar char="§"/>
+            </a:pPr>
+            <a:endParaRPr lang="en-US" sz="4800" dirty="0">
+              <a:latin typeface="Times New Roman"/>
+              <a:cs typeface="Times New Roman"/>
+            </a:endParaRPr>
+          </a:p>
+          <a:p>
+            <a:pPr marL="857250" indent="-857250">
+              <a:buFont typeface="Wingdings" pitchFamily="2" charset="2"/>
+              <a:buChar char="§"/>
+            </a:pPr>
+            <a:endParaRPr lang="en-US" sz="4800" dirty="0">
+              <a:latin typeface="Times New Roman"/>
+              <a:cs typeface="Times New Roman"/>
+            </a:endParaRPr>
+          </a:p>
+          <a:p>
+            <a:pPr marL="857250" indent="-857250">
+              <a:buFont typeface="Wingdings" pitchFamily="2" charset="2"/>
+              <a:buChar char="§"/>
+            </a:pPr>
+            <a:endParaRPr lang="en-US" sz="4800" dirty="0">
+              <a:latin typeface="Times New Roman"/>
+              <a:cs typeface="Times New Roman"/>
+            </a:endParaRPr>
+          </a:p>
+          <a:p>
+            <a:pPr marL="857250" indent="-857250">
+              <a:buFont typeface="Wingdings" pitchFamily="2" charset="2"/>
+              <a:buChar char="§"/>
+            </a:pPr>
+            <a:endParaRPr lang="en-US" sz="4800" dirty="0">
+              <a:latin typeface="Times New Roman"/>
+              <a:cs typeface="Times New Roman"/>
+            </a:endParaRPr>
+          </a:p>
+          <a:p>
+            <a:pPr marL="857250" indent="-857250">
+              <a:buFont typeface="Wingdings" pitchFamily="2" charset="2"/>
+              <a:buChar char="§"/>
+            </a:pPr>
+            <a:endParaRPr lang="en-US" sz="4800" dirty="0">
+              <a:latin typeface="Times New Roman"/>
+              <a:cs typeface="Times New Roman"/>
+            </a:endParaRPr>
+          </a:p>
+          <a:p>
+            <a:pPr marL="857250" indent="-857250">
+              <a:buFont typeface="Wingdings" pitchFamily="2" charset="2"/>
+              <a:buChar char="§"/>
+            </a:pPr>
+            <a:endParaRPr lang="en-US" sz="4800" dirty="0">
+              <a:latin typeface="Times New Roman"/>
+              <a:cs typeface="Times New Roman"/>
+            </a:endParaRPr>
+          </a:p>
+          <a:p>
+            <a:pPr marL="857250" indent="-857250">
+              <a:buFont typeface="Wingdings" pitchFamily="2" charset="2"/>
+              <a:buChar char="§"/>
+            </a:pPr>
+            <a:endParaRPr lang="en-US" sz="4800" dirty="0">
+              <a:latin typeface="Times New Roman"/>
+              <a:cs typeface="Times New Roman"/>
+            </a:endParaRPr>
+          </a:p>
+          <a:p>
+            <a:pPr marL="857250" indent="-857250">
+              <a:buFont typeface="Wingdings" pitchFamily="2" charset="2"/>
+              <a:buChar char="§"/>
+            </a:pPr>
+            <a:endParaRPr lang="en-US" sz="4800" dirty="0">
+              <a:latin typeface="Times New Roman"/>
+              <a:cs typeface="Times New Roman"/>
+            </a:endParaRPr>
+          </a:p>
+          <a:p>
+            <a:pPr marL="857250" indent="-857250">
+              <a:buFont typeface="Wingdings" pitchFamily="2" charset="2"/>
+              <a:buChar char="§"/>
+            </a:pPr>
+            <a:endParaRPr lang="en-US" sz="4800" dirty="0">
+              <a:latin typeface="Times New Roman"/>
+              <a:cs typeface="Times New Roman"/>
+            </a:endParaRPr>
+          </a:p>
+          <a:p>
+            <a:pPr marL="857250" indent="-857250">
+              <a:buFont typeface="Wingdings" pitchFamily="2" charset="2"/>
+              <a:buChar char="§"/>
+            </a:pPr>
+            <a:endParaRPr lang="en-US" sz="4800" dirty="0">
+              <a:latin typeface="Times New Roman"/>
+              <a:cs typeface="Times New Roman"/>
+            </a:endParaRPr>
+          </a:p>
+          <a:p>
+            <a:pPr marL="857250" indent="-857250">
+              <a:buFont typeface="Wingdings" pitchFamily="2" charset="2"/>
+              <a:buChar char="§"/>
+            </a:pPr>
+            <a:endParaRPr lang="en-US" sz="4800" dirty="0">
+              <a:latin typeface="Times New Roman"/>
+              <a:cs typeface="Times New Roman"/>
+            </a:endParaRPr>
+          </a:p>
+          <a:p>
+            <a:pPr marL="857250" indent="-857250">
+              <a:buFont typeface="Wingdings" pitchFamily="2" charset="2"/>
+              <a:buChar char="§"/>
+            </a:pPr>
+            <a:r>
+              <a:rPr lang="en-US" sz="4800" dirty="0" err="1">
+                <a:latin typeface="Times New Roman"/>
+                <a:cs typeface="Times New Roman"/>
+              </a:rPr>
+              <a:t>Xxxx</a:t>
+            </a:r>
+            <a:endParaRPr lang="en-US" sz="4800" dirty="0">
+              <a:latin typeface="Times New Roman"/>
+              <a:cs typeface="Times New Roman"/>
+            </a:endParaRPr>
+          </a:p>
+          <a:p>
+            <a:pPr marL="857250" indent="-857250">
+              <a:buFont typeface="Wingdings" pitchFamily="2" charset="2"/>
+              <a:buChar char="§"/>
+            </a:pPr>
+            <a:r>
+              <a:rPr lang="en-US" sz="4800" dirty="0" err="1">
+                <a:latin typeface="Times New Roman"/>
+                <a:cs typeface="Times New Roman"/>
+              </a:rPr>
+              <a:t>xxxx</a:t>
+            </a:r>
+            <a:endParaRPr lang="en-US" sz="4800" dirty="0">
+              <a:latin typeface="Times New Roman"/>
+              <a:cs typeface="Times New Roman"/>
+            </a:endParaRPr>
+          </a:p>
+          <a:p>
+            <a:endParaRPr lang="en-US" sz="6000" dirty="0">
+              <a:latin typeface="Times New Roman"/>
+              <a:cs typeface="Times New Roman"/>
+            </a:endParaRPr>
+          </a:p>
+        </p:txBody>
+      </p:sp>
     </p:spTree>
     <p:extLst>
       <p:ext uri="{BB962C8B-B14F-4D97-AF65-F5344CB8AC3E}">

</xml_diff>